<commit_message>
COMP270: Week 8 material and week 7 fixes
</commit_message>
<xml_diff>
--- a/COMP270/03/2020-21-COMP270-03-lecture-materials-4.pptx
+++ b/COMP270/03/2020-21-COMP270-03-lecture-materials-4.pptx
@@ -228,7 +228,7 @@
           <a:p>
             <a:fld id="{8906F081-8781-4431-8FD4-2CF608CD7C47}" type="datetimeFigureOut">
               <a:rPr lang="en-US" smtClean="0"/>
-              <a:t>9/5/2020</a:t>
+              <a:t>10/31/2020</a:t>
             </a:fld>
             <a:endParaRPr lang="en-US"/>
           </a:p>
@@ -393,7 +393,7 @@
           <a:p>
             <a:fld id="{F06CA47C-B7FD-4BE9-B0E6-81BA758D95F2}" type="datetimeFigureOut">
               <a:rPr lang="en-US" smtClean="0"/>
-              <a:t>9/5/2020</a:t>
+              <a:t>10/31/2020</a:t>
             </a:fld>
             <a:endParaRPr lang="en-US"/>
           </a:p>
@@ -2808,7 +2808,7 @@
           <a:p>
             <a:fld id="{33024136-D290-48F3-A182-4C46BEB5146B}" type="datetime1">
               <a:rPr lang="en-US" smtClean="0"/>
-              <a:t>9/5/2020</a:t>
+              <a:t>10/31/2020</a:t>
             </a:fld>
             <a:endParaRPr lang="en-US" dirty="0"/>
           </a:p>
@@ -2992,7 +2992,7 @@
           <a:p>
             <a:fld id="{9CC7D44C-38B1-4D0F-9006-D5774F331095}" type="datetime1">
               <a:rPr lang="en-US" smtClean="0"/>
-              <a:t>9/5/2020</a:t>
+              <a:t>10/31/2020</a:t>
             </a:fld>
             <a:endParaRPr lang="en-US"/>
           </a:p>
@@ -3186,7 +3186,7 @@
           <a:p>
             <a:fld id="{F98D518A-FD4F-4358-B95B-9DB5A17160FB}" type="datetime1">
               <a:rPr lang="en-US" smtClean="0"/>
-              <a:t>9/5/2020</a:t>
+              <a:t>10/31/2020</a:t>
             </a:fld>
             <a:endParaRPr lang="en-US"/>
           </a:p>
@@ -3379,7 +3379,7 @@
           <a:p>
             <a:fld id="{5E2A9F4F-03AD-4497-A65D-076601BD41D2}" type="datetime1">
               <a:rPr lang="en-US" smtClean="0"/>
-              <a:t>9/5/2020</a:t>
+              <a:t>10/31/2020</a:t>
             </a:fld>
             <a:endParaRPr lang="en-US"/>
           </a:p>
@@ -3602,7 +3602,7 @@
           <a:p>
             <a:fld id="{EDFBF3AC-A781-43AA-8BD5-B12F49168B94}" type="datetime1">
               <a:rPr lang="en-US" smtClean="0"/>
-              <a:t>9/5/2020</a:t>
+              <a:t>10/31/2020</a:t>
             </a:fld>
             <a:endParaRPr lang="en-US"/>
           </a:p>
@@ -3887,7 +3887,7 @@
           <a:p>
             <a:fld id="{C5256A41-C91B-43FF-9881-F5DA9878418F}" type="datetime1">
               <a:rPr lang="en-US" smtClean="0"/>
-              <a:t>9/5/2020</a:t>
+              <a:t>10/31/2020</a:t>
             </a:fld>
             <a:endParaRPr lang="en-US"/>
           </a:p>
@@ -4290,7 +4290,7 @@
           <a:p>
             <a:fld id="{FFD7AA76-41EE-4C13-950E-E611B8B8FC52}" type="datetime1">
               <a:rPr lang="en-US" smtClean="0"/>
-              <a:t>9/5/2020</a:t>
+              <a:t>10/31/2020</a:t>
             </a:fld>
             <a:endParaRPr lang="en-US"/>
           </a:p>
@@ -4437,7 +4437,7 @@
           <a:p>
             <a:fld id="{89407A26-E7BC-4498-97E4-87AF12377CA9}" type="datetime1">
               <a:rPr lang="en-US" smtClean="0"/>
-              <a:t>9/5/2020</a:t>
+              <a:t>10/31/2020</a:t>
             </a:fld>
             <a:endParaRPr lang="en-US"/>
           </a:p>
@@ -4552,7 +4552,7 @@
           <a:p>
             <a:fld id="{93EA4171-1117-4486-993C-35A7470D8847}" type="datetime1">
               <a:rPr lang="en-US" smtClean="0"/>
-              <a:t>9/5/2020</a:t>
+              <a:t>10/31/2020</a:t>
             </a:fld>
             <a:endParaRPr lang="en-US"/>
           </a:p>
@@ -4824,7 +4824,7 @@
           <a:p>
             <a:fld id="{472A4CB8-1563-4663-81DB-74EB416C19BE}" type="datetime1">
               <a:rPr lang="en-US" smtClean="0"/>
-              <a:t>9/5/2020</a:t>
+              <a:t>10/31/2020</a:t>
             </a:fld>
             <a:endParaRPr lang="en-US"/>
           </a:p>
@@ -5160,7 +5160,7 @@
           <a:p>
             <a:fld id="{0C6724CE-2468-448B-87C1-A92EDD78369B}" type="datetime1">
               <a:rPr lang="en-US" smtClean="0"/>
-              <a:t>9/5/2020</a:t>
+              <a:t>10/31/2020</a:t>
             </a:fld>
             <a:endParaRPr lang="en-US"/>
           </a:p>
@@ -5421,7 +5421,7 @@
           <a:p>
             <a:fld id="{4CD11720-76E7-46E6-B0AA-057287C42052}" type="datetime1">
               <a:rPr lang="en-US" smtClean="0"/>
-              <a:t>9/5/2020</a:t>
+              <a:t>10/31/2020</a:t>
             </a:fld>
             <a:endParaRPr lang="en-US" dirty="0"/>
           </a:p>
@@ -6909,8 +6909,8 @@
           </a:p>
         </p:txBody>
       </p:sp>
-      <mc:AlternateContent xmlns:mc="http://schemas.openxmlformats.org/markup-compatibility/2006" xmlns:a14="http://schemas.microsoft.com/office/drawing/2010/main">
-        <mc:Choice Requires="a14">
+      <mc:AlternateContent xmlns:mc="http://schemas.openxmlformats.org/markup-compatibility/2006">
+        <mc:Choice xmlns:a14="http://schemas.microsoft.com/office/drawing/2010/main" Requires="a14">
           <p:sp>
             <p:nvSpPr>
               <p:cNvPr id="3" name="Content Placeholder 2">
@@ -6952,7 +6952,17 @@
                 </a14:m>
                 <a:r>
                   <a:rPr lang="en-GB" dirty="0"/>
-                  <a:t>, the inverse of </a:t>
+                  <a:t>, the </a:t>
+                </a:r>
+                <a:r>
+                  <a:rPr lang="en-GB" b="1" dirty="0">
+                    <a:hlinkClick r:id="rId3"/>
+                  </a:rPr>
+                  <a:t>inverse</a:t>
+                </a:r>
+                <a:r>
+                  <a:rPr lang="en-GB" dirty="0"/>
+                  <a:t> of </a:t>
                 </a:r>
                 <a14:m>
                   <m:oMath xmlns:m="http://schemas.openxmlformats.org/officeDocument/2006/math">
@@ -7400,7 +7410,7 @@
             </p:txBody>
           </p:sp>
         </mc:Choice>
-        <mc:Fallback xmlns="">
+        <mc:Fallback>
           <p:sp>
             <p:nvSpPr>
               <p:cNvPr id="3" name="Content Placeholder 2">
@@ -7419,7 +7429,7 @@
             </p:nvSpPr>
             <p:spPr>
               <a:blipFill>
-                <a:blip r:embed="rId3"/>
+                <a:blip r:embed="rId4"/>
                 <a:stretch>
                   <a:fillRect l="-412" t="-1733"/>
                 </a:stretch>
@@ -7496,7 +7506,7 @@
             </a:r>
             <a:r>
               <a:rPr lang="en-GB" dirty="0">
-                <a:hlinkClick r:id="rId4"/>
+                <a:hlinkClick r:id="rId5"/>
               </a:rPr>
               <a:t>determinant</a:t>
             </a:r>
@@ -17824,8 +17834,8 @@
           </a:p>
         </p:txBody>
       </p:sp>
-      <mc:AlternateContent xmlns:mc="http://schemas.openxmlformats.org/markup-compatibility/2006">
-        <mc:Choice xmlns:a14="http://schemas.microsoft.com/office/drawing/2010/main" Requires="a14">
+      <mc:AlternateContent xmlns:mc="http://schemas.openxmlformats.org/markup-compatibility/2006" xmlns:a14="http://schemas.microsoft.com/office/drawing/2010/main">
+        <mc:Choice Requires="a14">
           <p:sp>
             <p:nvSpPr>
               <p:cNvPr id="3" name="Content Placeholder 2">
@@ -19159,7 +19169,7 @@
             </p:txBody>
           </p:sp>
         </mc:Choice>
-        <mc:Fallback>
+        <mc:Fallback xmlns="">
           <p:sp>
             <p:nvSpPr>
               <p:cNvPr id="3" name="Content Placeholder 2">
@@ -26023,8 +26033,8 @@
           </a:p>
         </p:txBody>
       </p:sp>
-      <mc:AlternateContent xmlns:mc="http://schemas.openxmlformats.org/markup-compatibility/2006">
-        <mc:Choice xmlns:a14="http://schemas.microsoft.com/office/drawing/2010/main" Requires="a14">
+      <mc:AlternateContent xmlns:mc="http://schemas.openxmlformats.org/markup-compatibility/2006" xmlns:a14="http://schemas.microsoft.com/office/drawing/2010/main">
+        <mc:Choice Requires="a14">
           <p:sp>
             <p:nvSpPr>
               <p:cNvPr id="3" name="Content Placeholder 2">
@@ -27127,7 +27137,7 @@
             </p:txBody>
           </p:sp>
         </mc:Choice>
-        <mc:Fallback>
+        <mc:Fallback xmlns="">
           <p:sp>
             <p:nvSpPr>
               <p:cNvPr id="3" name="Content Placeholder 2">

</xml_diff>